<commit_message>
working on game screen
</commit_message>
<xml_diff>
--- a/그림 만들기.pptx
+++ b/그림 만들기.pptx
@@ -197,7 +197,7 @@
             <a:fld id="{B478B745-BF05-4AEA-A995-7E994C8F897E}" type="datetimeFigureOut">
               <a:rPr lang="ko-KR" altLang="en-US" smtClean="0"/>
               <a:pPr/>
-              <a:t>2020-07-01</a:t>
+              <a:t>2020-07-03</a:t>
             </a:fld>
             <a:endParaRPr lang="ko-KR" altLang="en-US"/>
           </a:p>
@@ -809,7 +809,7 @@
             <a:fld id="{823895E5-2D2B-4236-AC77-BC0599642604}" type="datetimeFigureOut">
               <a:rPr lang="ko-KR" altLang="en-US" smtClean="0"/>
               <a:pPr/>
-              <a:t>2020-07-01</a:t>
+              <a:t>2020-07-03</a:t>
             </a:fld>
             <a:endParaRPr lang="ko-KR" altLang="en-US"/>
           </a:p>
@@ -976,7 +976,7 @@
             <a:fld id="{823895E5-2D2B-4236-AC77-BC0599642604}" type="datetimeFigureOut">
               <a:rPr lang="ko-KR" altLang="en-US" smtClean="0"/>
               <a:pPr/>
-              <a:t>2020-07-01</a:t>
+              <a:t>2020-07-03</a:t>
             </a:fld>
             <a:endParaRPr lang="ko-KR" altLang="en-US"/>
           </a:p>
@@ -1153,7 +1153,7 @@
             <a:fld id="{823895E5-2D2B-4236-AC77-BC0599642604}" type="datetimeFigureOut">
               <a:rPr lang="ko-KR" altLang="en-US" smtClean="0"/>
               <a:pPr/>
-              <a:t>2020-07-01</a:t>
+              <a:t>2020-07-03</a:t>
             </a:fld>
             <a:endParaRPr lang="ko-KR" altLang="en-US"/>
           </a:p>
@@ -1320,7 +1320,7 @@
             <a:fld id="{823895E5-2D2B-4236-AC77-BC0599642604}" type="datetimeFigureOut">
               <a:rPr lang="ko-KR" altLang="en-US" smtClean="0"/>
               <a:pPr/>
-              <a:t>2020-07-01</a:t>
+              <a:t>2020-07-03</a:t>
             </a:fld>
             <a:endParaRPr lang="ko-KR" altLang="en-US"/>
           </a:p>
@@ -1563,7 +1563,7 @@
             <a:fld id="{823895E5-2D2B-4236-AC77-BC0599642604}" type="datetimeFigureOut">
               <a:rPr lang="ko-KR" altLang="en-US" smtClean="0"/>
               <a:pPr/>
-              <a:t>2020-07-01</a:t>
+              <a:t>2020-07-03</a:t>
             </a:fld>
             <a:endParaRPr lang="ko-KR" altLang="en-US"/>
           </a:p>
@@ -1848,7 +1848,7 @@
             <a:fld id="{823895E5-2D2B-4236-AC77-BC0599642604}" type="datetimeFigureOut">
               <a:rPr lang="ko-KR" altLang="en-US" smtClean="0"/>
               <a:pPr/>
-              <a:t>2020-07-01</a:t>
+              <a:t>2020-07-03</a:t>
             </a:fld>
             <a:endParaRPr lang="ko-KR" altLang="en-US"/>
           </a:p>
@@ -2267,7 +2267,7 @@
             <a:fld id="{823895E5-2D2B-4236-AC77-BC0599642604}" type="datetimeFigureOut">
               <a:rPr lang="ko-KR" altLang="en-US" smtClean="0"/>
               <a:pPr/>
-              <a:t>2020-07-01</a:t>
+              <a:t>2020-07-03</a:t>
             </a:fld>
             <a:endParaRPr lang="ko-KR" altLang="en-US"/>
           </a:p>
@@ -2382,7 +2382,7 @@
             <a:fld id="{823895E5-2D2B-4236-AC77-BC0599642604}" type="datetimeFigureOut">
               <a:rPr lang="ko-KR" altLang="en-US" smtClean="0"/>
               <a:pPr/>
-              <a:t>2020-07-01</a:t>
+              <a:t>2020-07-03</a:t>
             </a:fld>
             <a:endParaRPr lang="ko-KR" altLang="en-US"/>
           </a:p>
@@ -2474,7 +2474,7 @@
             <a:fld id="{823895E5-2D2B-4236-AC77-BC0599642604}" type="datetimeFigureOut">
               <a:rPr lang="ko-KR" altLang="en-US" smtClean="0"/>
               <a:pPr/>
-              <a:t>2020-07-01</a:t>
+              <a:t>2020-07-03</a:t>
             </a:fld>
             <a:endParaRPr lang="ko-KR" altLang="en-US"/>
           </a:p>
@@ -2748,7 +2748,7 @@
             <a:fld id="{823895E5-2D2B-4236-AC77-BC0599642604}" type="datetimeFigureOut">
               <a:rPr lang="ko-KR" altLang="en-US" smtClean="0"/>
               <a:pPr/>
-              <a:t>2020-07-01</a:t>
+              <a:t>2020-07-03</a:t>
             </a:fld>
             <a:endParaRPr lang="ko-KR" altLang="en-US"/>
           </a:p>
@@ -2998,7 +2998,7 @@
             <a:fld id="{823895E5-2D2B-4236-AC77-BC0599642604}" type="datetimeFigureOut">
               <a:rPr lang="ko-KR" altLang="en-US" smtClean="0"/>
               <a:pPr/>
-              <a:t>2020-07-01</a:t>
+              <a:t>2020-07-03</a:t>
             </a:fld>
             <a:endParaRPr lang="ko-KR" altLang="en-US"/>
           </a:p>
@@ -3208,7 +3208,7 @@
             <a:fld id="{823895E5-2D2B-4236-AC77-BC0599642604}" type="datetimeFigureOut">
               <a:rPr lang="ko-KR" altLang="en-US" smtClean="0"/>
               <a:pPr/>
-              <a:t>2020-07-01</a:t>
+              <a:t>2020-07-03</a:t>
             </a:fld>
             <a:endParaRPr lang="ko-KR" altLang="en-US"/>
           </a:p>
@@ -4779,6 +4779,111 @@
           </a:prstGeom>
         </p:spPr>
       </p:pic>
+      <p:sp>
+        <p:nvSpPr>
+          <p:cNvPr id="16" name="모서리가 둥근 직사각형 15"/>
+          <p:cNvSpPr/>
+          <p:nvPr/>
+        </p:nvSpPr>
+        <p:spPr>
+          <a:xfrm>
+            <a:off x="2627784" y="3789040"/>
+            <a:ext cx="1800000" cy="1800000"/>
+          </a:xfrm>
+          <a:prstGeom prst="roundRect">
+            <a:avLst/>
+          </a:prstGeom>
+          <a:solidFill>
+            <a:schemeClr val="accent4">
+              <a:lumMod val="60000"/>
+              <a:lumOff val="40000"/>
+            </a:schemeClr>
+          </a:solidFill>
+          <a:ln>
+            <a:solidFill>
+              <a:schemeClr val="accent1">
+                <a:lumMod val="20000"/>
+                <a:lumOff val="80000"/>
+              </a:schemeClr>
+            </a:solidFill>
+            <a:prstDash val="solid"/>
+          </a:ln>
+          <a:effectLst>
+            <a:outerShdw blurRad="63500" sx="102000" sy="102000" algn="ctr" rotWithShape="0">
+              <a:prstClr val="black">
+                <a:alpha val="40000"/>
+              </a:prstClr>
+            </a:outerShdw>
+          </a:effectLst>
+          <a:scene3d>
+            <a:camera prst="orthographicFront"/>
+            <a:lightRig rig="threePt" dir="t"/>
+          </a:scene3d>
+          <a:sp3d>
+            <a:bevelT/>
+          </a:sp3d>
+        </p:spPr>
+        <p:style>
+          <a:lnRef idx="2">
+            <a:schemeClr val="accent1">
+              <a:shade val="50000"/>
+            </a:schemeClr>
+          </a:lnRef>
+          <a:fillRef idx="1">
+            <a:schemeClr val="accent1"/>
+          </a:fillRef>
+          <a:effectRef idx="0">
+            <a:schemeClr val="accent1"/>
+          </a:effectRef>
+          <a:fontRef idx="minor">
+            <a:schemeClr val="lt1"/>
+          </a:fontRef>
+        </p:style>
+        <p:txBody>
+          <a:bodyPr rtlCol="0" anchor="ctr">
+            <a:scene3d>
+              <a:camera prst="orthographicFront"/>
+              <a:lightRig rig="soft" dir="tl">
+                <a:rot lat="0" lon="0" rev="0"/>
+              </a:lightRig>
+            </a:scene3d>
+            <a:sp3d contourW="25400" prstMaterial="matte">
+              <a:contourClr>
+                <a:schemeClr val="accent2">
+                  <a:tint val="20000"/>
+                </a:schemeClr>
+              </a:contourClr>
+            </a:sp3d>
+          </a:bodyPr>
+          <a:lstStyle/>
+          <a:p>
+            <a:pPr algn="ctr"/>
+            <a:endParaRPr lang="ko-KR" altLang="en-US" b="1" spc="50" dirty="0" smtClean="0">
+              <a:ln w="11430">
+                <a:solidFill>
+                  <a:srgbClr val="00B050"/>
+                </a:solidFill>
+              </a:ln>
+              <a:solidFill>
+                <a:srgbClr val="00B050"/>
+              </a:solidFill>
+              <a:effectLst>
+                <a:glow rad="228600">
+                  <a:schemeClr val="accent6">
+                    <a:satMod val="175000"/>
+                    <a:alpha val="40000"/>
+                  </a:schemeClr>
+                </a:glow>
+                <a:outerShdw blurRad="50800" dist="38100" dir="2700000" algn="tl" rotWithShape="0">
+                  <a:prstClr val="black">
+                    <a:alpha val="40000"/>
+                  </a:prstClr>
+                </a:outerShdw>
+              </a:effectLst>
+            </a:endParaRPr>
+          </a:p>
+        </p:txBody>
+      </p:sp>
     </p:spTree>
   </p:cSld>
   <p:clrMapOvr>
@@ -5845,7 +5950,7 @@
       </p:grpSpPr>
       <p:grpSp>
         <p:nvGrpSpPr>
-          <p:cNvPr id="8" name="그룹 7"/>
+          <p:cNvPr id="49" name="그룹 48"/>
           <p:cNvGrpSpPr/>
           <p:nvPr/>
         </p:nvGrpSpPr>
@@ -5857,41 +5962,444 @@
             <a:chExt cx="8640000" cy="5760000"/>
           </a:xfrm>
         </p:grpSpPr>
-        <p:pic>
-          <p:nvPicPr>
-            <p:cNvPr id="2" name="그림 1" descr="crop-athlete-kicking-soccer-ball_23-2147817301.jpg"/>
-            <p:cNvPicPr preferRelativeResize="0">
-              <a:picLocks/>
-            </p:cNvPicPr>
+        <p:grpSp>
+          <p:nvGrpSpPr>
+            <p:cNvPr id="47" name="그룹 46"/>
+            <p:cNvGrpSpPr/>
             <p:nvPr/>
-          </p:nvPicPr>
-          <p:blipFill>
-            <a:blip r:embed="rId2" cstate="print"/>
-            <a:stretch>
-              <a:fillRect/>
-            </a:stretch>
-          </p:blipFill>
-          <p:spPr>
+          </p:nvGrpSpPr>
+          <p:grpSpPr>
             <a:xfrm>
               <a:off x="323528" y="404664"/>
               <a:ext cx="8640000" cy="5760000"/>
+              <a:chOff x="323528" y="404664"/>
+              <a:chExt cx="8640000" cy="5760000"/>
             </a:xfrm>
-            <a:prstGeom prst="rect">
-              <a:avLst/>
-            </a:prstGeom>
-            <a:effectLst/>
-          </p:spPr>
-        </p:pic>
+          </p:grpSpPr>
+          <p:pic>
+            <p:nvPicPr>
+              <p:cNvPr id="2" name="그림 1" descr="crop-athlete-kicking-soccer-ball_23-2147817301.jpg"/>
+              <p:cNvPicPr preferRelativeResize="0">
+                <a:picLocks/>
+              </p:cNvPicPr>
+              <p:nvPr/>
+            </p:nvPicPr>
+            <p:blipFill>
+              <a:blip r:embed="rId2" cstate="print"/>
+              <a:stretch>
+                <a:fillRect/>
+              </a:stretch>
+            </p:blipFill>
+            <p:spPr>
+              <a:xfrm>
+                <a:off x="323528" y="404664"/>
+                <a:ext cx="8640000" cy="5760000"/>
+              </a:xfrm>
+              <a:prstGeom prst="rect">
+                <a:avLst/>
+              </a:prstGeom>
+              <a:effectLst/>
+            </p:spPr>
+          </p:pic>
+          <p:sp>
+            <p:nvSpPr>
+              <p:cNvPr id="3" name="직사각형 2"/>
+              <p:cNvSpPr/>
+              <p:nvPr/>
+            </p:nvSpPr>
+            <p:spPr>
+              <a:xfrm>
+                <a:off x="1835696" y="1268760"/>
+                <a:ext cx="6984776" cy="4752528"/>
+              </a:xfrm>
+              <a:prstGeom prst="rect">
+                <a:avLst/>
+              </a:prstGeom>
+              <a:solidFill>
+                <a:srgbClr val="92D050">
+                  <a:alpha val="70000"/>
+                </a:srgbClr>
+              </a:solidFill>
+              <a:ln>
+                <a:solidFill>
+                  <a:schemeClr val="accent3">
+                    <a:lumMod val="60000"/>
+                    <a:lumOff val="40000"/>
+                  </a:schemeClr>
+                </a:solidFill>
+                <a:prstDash val="solid"/>
+              </a:ln>
+              <a:effectLst/>
+              <a:scene3d>
+                <a:camera prst="orthographicFront"/>
+                <a:lightRig rig="threePt" dir="t"/>
+              </a:scene3d>
+              <a:sp3d/>
+            </p:spPr>
+            <p:style>
+              <a:lnRef idx="2">
+                <a:schemeClr val="accent1">
+                  <a:shade val="50000"/>
+                </a:schemeClr>
+              </a:lnRef>
+              <a:fillRef idx="1">
+                <a:schemeClr val="accent1"/>
+              </a:fillRef>
+              <a:effectRef idx="0">
+                <a:schemeClr val="accent1"/>
+              </a:effectRef>
+              <a:fontRef idx="minor">
+                <a:schemeClr val="lt1"/>
+              </a:fontRef>
+            </p:style>
+            <p:txBody>
+              <a:bodyPr rtlCol="0" anchor="ctr">
+                <a:scene3d>
+                  <a:camera prst="orthographicFront"/>
+                  <a:lightRig rig="soft" dir="tl">
+                    <a:rot lat="0" lon="0" rev="0"/>
+                  </a:lightRig>
+                </a:scene3d>
+                <a:sp3d contourW="25400" prstMaterial="matte">
+                  <a:bevelT w="25400" h="55880" prst="artDeco"/>
+                  <a:contourClr>
+                    <a:schemeClr val="accent2">
+                      <a:tint val="20000"/>
+                    </a:schemeClr>
+                  </a:contourClr>
+                </a:sp3d>
+              </a:bodyPr>
+              <a:lstStyle/>
+              <a:p>
+                <a:pPr algn="ctr"/>
+                <a:endParaRPr lang="ko-KR" altLang="en-US" b="1" spc="50" dirty="0" smtClean="0">
+                  <a:ln w="11430">
+                    <a:solidFill>
+                      <a:srgbClr val="00B050"/>
+                    </a:solidFill>
+                  </a:ln>
+                  <a:solidFill>
+                    <a:srgbClr val="00B050"/>
+                  </a:solidFill>
+                  <a:effectLst>
+                    <a:glow rad="228600">
+                      <a:schemeClr val="accent6">
+                        <a:satMod val="175000"/>
+                        <a:alpha val="40000"/>
+                      </a:schemeClr>
+                    </a:glow>
+                    <a:outerShdw blurRad="50800" dist="38100" dir="2700000" algn="tl" rotWithShape="0">
+                      <a:prstClr val="black">
+                        <a:alpha val="40000"/>
+                      </a:prstClr>
+                    </a:outerShdw>
+                  </a:effectLst>
+                </a:endParaRPr>
+              </a:p>
+            </p:txBody>
+          </p:sp>
+          <p:sp>
+            <p:nvSpPr>
+              <p:cNvPr id="4" name="직사각형 3"/>
+              <p:cNvSpPr/>
+              <p:nvPr/>
+            </p:nvSpPr>
+            <p:spPr>
+              <a:xfrm>
+                <a:off x="539552" y="1268760"/>
+                <a:ext cx="1296144" cy="4752528"/>
+              </a:xfrm>
+              <a:prstGeom prst="rect">
+                <a:avLst/>
+              </a:prstGeom>
+              <a:solidFill>
+                <a:srgbClr val="92D050">
+                  <a:alpha val="70000"/>
+                </a:srgbClr>
+              </a:solidFill>
+              <a:ln>
+                <a:solidFill>
+                  <a:schemeClr val="accent3">
+                    <a:lumMod val="60000"/>
+                    <a:lumOff val="40000"/>
+                  </a:schemeClr>
+                </a:solidFill>
+                <a:prstDash val="solid"/>
+              </a:ln>
+              <a:effectLst/>
+              <a:scene3d>
+                <a:camera prst="orthographicFront"/>
+                <a:lightRig rig="threePt" dir="t"/>
+              </a:scene3d>
+              <a:sp3d/>
+            </p:spPr>
+            <p:style>
+              <a:lnRef idx="2">
+                <a:schemeClr val="accent1">
+                  <a:shade val="50000"/>
+                </a:schemeClr>
+              </a:lnRef>
+              <a:fillRef idx="1">
+                <a:schemeClr val="accent1"/>
+              </a:fillRef>
+              <a:effectRef idx="0">
+                <a:schemeClr val="accent1"/>
+              </a:effectRef>
+              <a:fontRef idx="minor">
+                <a:schemeClr val="lt1"/>
+              </a:fontRef>
+            </p:style>
+            <p:txBody>
+              <a:bodyPr rtlCol="0" anchor="ctr">
+                <a:scene3d>
+                  <a:camera prst="orthographicFront"/>
+                  <a:lightRig rig="soft" dir="tl">
+                    <a:rot lat="0" lon="0" rev="0"/>
+                  </a:lightRig>
+                </a:scene3d>
+                <a:sp3d contourW="25400" prstMaterial="matte">
+                  <a:bevelT w="25400" h="55880" prst="artDeco"/>
+                  <a:contourClr>
+                    <a:schemeClr val="accent2">
+                      <a:tint val="20000"/>
+                    </a:schemeClr>
+                  </a:contourClr>
+                </a:sp3d>
+              </a:bodyPr>
+              <a:lstStyle/>
+              <a:p>
+                <a:pPr algn="ctr"/>
+                <a:endParaRPr lang="ko-KR" altLang="en-US" b="1" spc="50" dirty="0" smtClean="0">
+                  <a:ln w="11430">
+                    <a:solidFill>
+                      <a:srgbClr val="00B050"/>
+                    </a:solidFill>
+                  </a:ln>
+                  <a:solidFill>
+                    <a:srgbClr val="00B050"/>
+                  </a:solidFill>
+                  <a:effectLst>
+                    <a:glow rad="228600">
+                      <a:schemeClr val="accent6">
+                        <a:satMod val="175000"/>
+                        <a:alpha val="40000"/>
+                      </a:schemeClr>
+                    </a:glow>
+                    <a:outerShdw blurRad="50800" dist="38100" dir="2700000" algn="tl" rotWithShape="0">
+                      <a:prstClr val="black">
+                        <a:alpha val="40000"/>
+                      </a:prstClr>
+                    </a:outerShdw>
+                  </a:effectLst>
+                </a:endParaRPr>
+              </a:p>
+            </p:txBody>
+          </p:sp>
+          <p:sp>
+            <p:nvSpPr>
+              <p:cNvPr id="5" name="직사각형 4"/>
+              <p:cNvSpPr/>
+              <p:nvPr/>
+            </p:nvSpPr>
+            <p:spPr>
+              <a:xfrm>
+                <a:off x="1835696" y="620688"/>
+                <a:ext cx="6984776" cy="648072"/>
+              </a:xfrm>
+              <a:prstGeom prst="rect">
+                <a:avLst/>
+              </a:prstGeom>
+              <a:solidFill>
+                <a:srgbClr val="92D050">
+                  <a:alpha val="70000"/>
+                </a:srgbClr>
+              </a:solidFill>
+              <a:ln>
+                <a:solidFill>
+                  <a:schemeClr val="accent3">
+                    <a:lumMod val="60000"/>
+                    <a:lumOff val="40000"/>
+                  </a:schemeClr>
+                </a:solidFill>
+                <a:prstDash val="solid"/>
+              </a:ln>
+              <a:effectLst/>
+              <a:scene3d>
+                <a:camera prst="orthographicFront"/>
+                <a:lightRig rig="threePt" dir="t"/>
+              </a:scene3d>
+              <a:sp3d/>
+            </p:spPr>
+            <p:style>
+              <a:lnRef idx="2">
+                <a:schemeClr val="accent1">
+                  <a:shade val="50000"/>
+                </a:schemeClr>
+              </a:lnRef>
+              <a:fillRef idx="1">
+                <a:schemeClr val="accent1"/>
+              </a:fillRef>
+              <a:effectRef idx="0">
+                <a:schemeClr val="accent1"/>
+              </a:effectRef>
+              <a:fontRef idx="minor">
+                <a:schemeClr val="lt1"/>
+              </a:fontRef>
+            </p:style>
+            <p:txBody>
+              <a:bodyPr rtlCol="0" anchor="ctr">
+                <a:scene3d>
+                  <a:camera prst="orthographicFront"/>
+                  <a:lightRig rig="soft" dir="tl">
+                    <a:rot lat="0" lon="0" rev="0"/>
+                  </a:lightRig>
+                </a:scene3d>
+                <a:sp3d contourW="25400" prstMaterial="matte">
+                  <a:bevelT w="25400" h="55880" prst="artDeco"/>
+                  <a:contourClr>
+                    <a:schemeClr val="accent2">
+                      <a:tint val="20000"/>
+                    </a:schemeClr>
+                  </a:contourClr>
+                </a:sp3d>
+              </a:bodyPr>
+              <a:lstStyle/>
+              <a:p>
+                <a:pPr algn="ctr"/>
+                <a:endParaRPr lang="ko-KR" altLang="en-US" b="1" spc="50" dirty="0" smtClean="0">
+                  <a:ln w="11430">
+                    <a:solidFill>
+                      <a:srgbClr val="00B050"/>
+                    </a:solidFill>
+                  </a:ln>
+                  <a:solidFill>
+                    <a:srgbClr val="00B050"/>
+                  </a:solidFill>
+                  <a:effectLst>
+                    <a:glow rad="228600">
+                      <a:schemeClr val="accent6">
+                        <a:satMod val="175000"/>
+                        <a:alpha val="40000"/>
+                      </a:schemeClr>
+                    </a:glow>
+                    <a:outerShdw blurRad="50800" dist="38100" dir="2700000" algn="tl" rotWithShape="0">
+                      <a:prstClr val="black">
+                        <a:alpha val="40000"/>
+                      </a:prstClr>
+                    </a:outerShdw>
+                  </a:effectLst>
+                </a:endParaRPr>
+              </a:p>
+            </p:txBody>
+          </p:sp>
+          <p:sp>
+            <p:nvSpPr>
+              <p:cNvPr id="38" name="직사각형 37"/>
+              <p:cNvSpPr/>
+              <p:nvPr/>
+            </p:nvSpPr>
+            <p:spPr>
+              <a:xfrm>
+                <a:off x="1187624" y="620688"/>
+                <a:ext cx="648072" cy="648072"/>
+              </a:xfrm>
+              <a:prstGeom prst="rect">
+                <a:avLst/>
+              </a:prstGeom>
+              <a:solidFill>
+                <a:srgbClr val="92D050">
+                  <a:alpha val="70000"/>
+                </a:srgbClr>
+              </a:solidFill>
+              <a:ln>
+                <a:solidFill>
+                  <a:schemeClr val="accent3">
+                    <a:lumMod val="60000"/>
+                    <a:lumOff val="40000"/>
+                  </a:schemeClr>
+                </a:solidFill>
+                <a:prstDash val="solid"/>
+              </a:ln>
+              <a:effectLst/>
+              <a:scene3d>
+                <a:camera prst="orthographicFront"/>
+                <a:lightRig rig="threePt" dir="t"/>
+              </a:scene3d>
+              <a:sp3d/>
+            </p:spPr>
+            <p:style>
+              <a:lnRef idx="2">
+                <a:schemeClr val="accent1">
+                  <a:shade val="50000"/>
+                </a:schemeClr>
+              </a:lnRef>
+              <a:fillRef idx="1">
+                <a:schemeClr val="accent1"/>
+              </a:fillRef>
+              <a:effectRef idx="0">
+                <a:schemeClr val="accent1"/>
+              </a:effectRef>
+              <a:fontRef idx="minor">
+                <a:schemeClr val="lt1"/>
+              </a:fontRef>
+            </p:style>
+            <p:txBody>
+              <a:bodyPr rtlCol="0" anchor="ctr">
+                <a:scene3d>
+                  <a:camera prst="orthographicFront"/>
+                  <a:lightRig rig="soft" dir="tl">
+                    <a:rot lat="0" lon="0" rev="0"/>
+                  </a:lightRig>
+                </a:scene3d>
+                <a:sp3d contourW="25400" prstMaterial="matte">
+                  <a:bevelT w="25400" h="55880" prst="artDeco"/>
+                  <a:contourClr>
+                    <a:schemeClr val="accent2">
+                      <a:tint val="20000"/>
+                    </a:schemeClr>
+                  </a:contourClr>
+                </a:sp3d>
+              </a:bodyPr>
+              <a:lstStyle/>
+              <a:p>
+                <a:pPr algn="ctr"/>
+                <a:endParaRPr lang="ko-KR" altLang="en-US" b="1" spc="50" dirty="0" smtClean="0">
+                  <a:ln w="11430">
+                    <a:solidFill>
+                      <a:srgbClr val="00B050"/>
+                    </a:solidFill>
+                  </a:ln>
+                  <a:solidFill>
+                    <a:srgbClr val="00B050"/>
+                  </a:solidFill>
+                  <a:effectLst>
+                    <a:glow rad="228600">
+                      <a:schemeClr val="accent6">
+                        <a:satMod val="175000"/>
+                        <a:alpha val="40000"/>
+                      </a:schemeClr>
+                    </a:glow>
+                    <a:outerShdw blurRad="50800" dist="38100" dir="2700000" algn="tl" rotWithShape="0">
+                      <a:prstClr val="black">
+                        <a:alpha val="40000"/>
+                      </a:prstClr>
+                    </a:outerShdw>
+                  </a:effectLst>
+                </a:endParaRPr>
+              </a:p>
+            </p:txBody>
+          </p:sp>
+        </p:grpSp>
         <p:sp>
           <p:nvSpPr>
-            <p:cNvPr id="3" name="직사각형 2"/>
+            <p:cNvPr id="48" name="직사각형 47"/>
             <p:cNvSpPr/>
             <p:nvPr/>
           </p:nvSpPr>
           <p:spPr>
             <a:xfrm>
-              <a:off x="1187624" y="1268760"/>
-              <a:ext cx="7632848" cy="4752528"/>
+              <a:off x="539552" y="620688"/>
+              <a:ext cx="648072" cy="648072"/>
             </a:xfrm>
             <a:prstGeom prst="rect">
               <a:avLst/>
@@ -5979,200 +6487,21 @@
             </a:p>
           </p:txBody>
         </p:sp>
-        <p:sp>
-          <p:nvSpPr>
-            <p:cNvPr id="4" name="직사각형 3"/>
-            <p:cNvSpPr/>
-            <p:nvPr/>
-          </p:nvSpPr>
-          <p:spPr>
-            <a:xfrm>
-              <a:off x="539552" y="1268760"/>
-              <a:ext cx="648072" cy="4752528"/>
-            </a:xfrm>
-            <a:prstGeom prst="rect">
-              <a:avLst/>
-            </a:prstGeom>
-            <a:solidFill>
-              <a:srgbClr val="92D050">
-                <a:alpha val="70000"/>
-              </a:srgbClr>
-            </a:solidFill>
-            <a:ln>
-              <a:solidFill>
-                <a:schemeClr val="accent3">
-                  <a:lumMod val="60000"/>
-                  <a:lumOff val="40000"/>
-                </a:schemeClr>
-              </a:solidFill>
-              <a:prstDash val="solid"/>
-            </a:ln>
-            <a:effectLst/>
-            <a:scene3d>
-              <a:camera prst="orthographicFront"/>
-              <a:lightRig rig="threePt" dir="t"/>
-            </a:scene3d>
-            <a:sp3d/>
-          </p:spPr>
-          <p:style>
-            <a:lnRef idx="2">
-              <a:schemeClr val="accent1">
-                <a:shade val="50000"/>
-              </a:schemeClr>
-            </a:lnRef>
-            <a:fillRef idx="1">
-              <a:schemeClr val="accent1"/>
-            </a:fillRef>
-            <a:effectRef idx="0">
-              <a:schemeClr val="accent1"/>
-            </a:effectRef>
-            <a:fontRef idx="minor">
-              <a:schemeClr val="lt1"/>
-            </a:fontRef>
-          </p:style>
-          <p:txBody>
-            <a:bodyPr rtlCol="0" anchor="ctr">
-              <a:scene3d>
-                <a:camera prst="orthographicFront"/>
-                <a:lightRig rig="soft" dir="tl">
-                  <a:rot lat="0" lon="0" rev="0"/>
-                </a:lightRig>
-              </a:scene3d>
-              <a:sp3d contourW="25400" prstMaterial="matte">
-                <a:bevelT w="25400" h="55880" prst="artDeco"/>
-                <a:contourClr>
-                  <a:schemeClr val="accent2">
-                    <a:tint val="20000"/>
-                  </a:schemeClr>
-                </a:contourClr>
-              </a:sp3d>
-            </a:bodyPr>
-            <a:lstStyle/>
-            <a:p>
-              <a:pPr algn="ctr"/>
-              <a:endParaRPr lang="ko-KR" altLang="en-US" b="1" spc="50" dirty="0" smtClean="0">
-                <a:ln w="11430">
-                  <a:solidFill>
-                    <a:srgbClr val="00B050"/>
-                  </a:solidFill>
-                </a:ln>
-                <a:solidFill>
-                  <a:srgbClr val="00B050"/>
-                </a:solidFill>
-                <a:effectLst>
-                  <a:glow rad="228600">
-                    <a:schemeClr val="accent6">
-                      <a:satMod val="175000"/>
-                      <a:alpha val="40000"/>
-                    </a:schemeClr>
-                  </a:glow>
-                  <a:outerShdw blurRad="50800" dist="38100" dir="2700000" algn="tl" rotWithShape="0">
-                    <a:prstClr val="black">
-                      <a:alpha val="40000"/>
-                    </a:prstClr>
-                  </a:outerShdw>
-                </a:effectLst>
-              </a:endParaRPr>
-            </a:p>
-          </p:txBody>
-        </p:sp>
-        <p:sp>
-          <p:nvSpPr>
-            <p:cNvPr id="5" name="직사각형 4"/>
-            <p:cNvSpPr/>
-            <p:nvPr/>
-          </p:nvSpPr>
-          <p:spPr>
-            <a:xfrm>
-              <a:off x="1187624" y="620688"/>
-              <a:ext cx="7632848" cy="648072"/>
-            </a:xfrm>
-            <a:prstGeom prst="rect">
-              <a:avLst/>
-            </a:prstGeom>
-            <a:solidFill>
-              <a:srgbClr val="92D050">
-                <a:alpha val="70000"/>
-              </a:srgbClr>
-            </a:solidFill>
-            <a:ln>
-              <a:solidFill>
-                <a:schemeClr val="accent3">
-                  <a:lumMod val="60000"/>
-                  <a:lumOff val="40000"/>
-                </a:schemeClr>
-              </a:solidFill>
-              <a:prstDash val="solid"/>
-            </a:ln>
-            <a:effectLst/>
-            <a:scene3d>
-              <a:camera prst="orthographicFront"/>
-              <a:lightRig rig="threePt" dir="t"/>
-            </a:scene3d>
-            <a:sp3d/>
-          </p:spPr>
-          <p:style>
-            <a:lnRef idx="2">
-              <a:schemeClr val="accent1">
-                <a:shade val="50000"/>
-              </a:schemeClr>
-            </a:lnRef>
-            <a:fillRef idx="1">
-              <a:schemeClr val="accent1"/>
-            </a:fillRef>
-            <a:effectRef idx="0">
-              <a:schemeClr val="accent1"/>
-            </a:effectRef>
-            <a:fontRef idx="minor">
-              <a:schemeClr val="lt1"/>
-            </a:fontRef>
-          </p:style>
-          <p:txBody>
-            <a:bodyPr rtlCol="0" anchor="ctr">
-              <a:scene3d>
-                <a:camera prst="orthographicFront"/>
-                <a:lightRig rig="soft" dir="tl">
-                  <a:rot lat="0" lon="0" rev="0"/>
-                </a:lightRig>
-              </a:scene3d>
-              <a:sp3d contourW="25400" prstMaterial="matte">
-                <a:bevelT w="25400" h="55880" prst="artDeco"/>
-                <a:contourClr>
-                  <a:schemeClr val="accent2">
-                    <a:tint val="20000"/>
-                  </a:schemeClr>
-                </a:contourClr>
-              </a:sp3d>
-            </a:bodyPr>
-            <a:lstStyle/>
-            <a:p>
-              <a:pPr algn="ctr"/>
-              <a:endParaRPr lang="ko-KR" altLang="en-US" b="1" spc="50" dirty="0" smtClean="0">
-                <a:ln w="11430">
-                  <a:solidFill>
-                    <a:srgbClr val="00B050"/>
-                  </a:solidFill>
-                </a:ln>
-                <a:solidFill>
-                  <a:srgbClr val="00B050"/>
-                </a:solidFill>
-                <a:effectLst>
-                  <a:glow rad="228600">
-                    <a:schemeClr val="accent6">
-                      <a:satMod val="175000"/>
-                      <a:alpha val="40000"/>
-                    </a:schemeClr>
-                  </a:glow>
-                  <a:outerShdw blurRad="50800" dist="38100" dir="2700000" algn="tl" rotWithShape="0">
-                    <a:prstClr val="black">
-                      <a:alpha val="40000"/>
-                    </a:prstClr>
-                  </a:outerShdw>
-                </a:effectLst>
-              </a:endParaRPr>
-            </a:p>
-          </p:txBody>
-        </p:sp>
+      </p:grpSp>
+      <p:grpSp>
+        <p:nvGrpSpPr>
+          <p:cNvPr id="45" name="그룹 44"/>
+          <p:cNvGrpSpPr/>
+          <p:nvPr/>
+        </p:nvGrpSpPr>
+        <p:grpSpPr>
+          <a:xfrm>
+            <a:off x="539552" y="620688"/>
+            <a:ext cx="648072" cy="648072"/>
+            <a:chOff x="-1116632" y="1412776"/>
+            <a:chExt cx="648072" cy="648072"/>
+          </a:xfrm>
+        </p:grpSpPr>
         <p:sp>
           <p:nvSpPr>
             <p:cNvPr id="13" name="직사각형 12"/>
@@ -6181,7 +6510,7 @@
           </p:nvSpPr>
           <p:spPr>
             <a:xfrm>
-              <a:off x="539552" y="620688"/>
+              <a:off x="-1116632" y="1412776"/>
               <a:ext cx="648072" cy="648072"/>
             </a:xfrm>
             <a:prstGeom prst="rect">
@@ -6291,8 +6620,8 @@
           </p:blipFill>
           <p:spPr>
             <a:xfrm>
-              <a:off x="539552" y="620688"/>
-              <a:ext cx="648000" cy="648000"/>
+              <a:off x="-1116632" y="1412776"/>
+              <a:ext cx="648072" cy="648000"/>
             </a:xfrm>
             <a:prstGeom prst="rect">
               <a:avLst/>
@@ -6301,6 +6630,1397 @@
           </p:spPr>
         </p:pic>
       </p:grpSp>
+      <p:sp>
+        <p:nvSpPr>
+          <p:cNvPr id="19" name="모서리가 둥근 직사각형 18"/>
+          <p:cNvSpPr/>
+          <p:nvPr/>
+        </p:nvSpPr>
+        <p:spPr>
+          <a:xfrm>
+            <a:off x="611560" y="1412776"/>
+            <a:ext cx="1152128" cy="396000"/>
+          </a:xfrm>
+          <a:prstGeom prst="roundRect">
+            <a:avLst/>
+          </a:prstGeom>
+          <a:solidFill>
+            <a:schemeClr val="accent5">
+              <a:lumMod val="60000"/>
+              <a:lumOff val="40000"/>
+            </a:schemeClr>
+          </a:solidFill>
+          <a:ln>
+            <a:solidFill>
+              <a:schemeClr val="accent1">
+                <a:lumMod val="20000"/>
+                <a:lumOff val="80000"/>
+              </a:schemeClr>
+            </a:solidFill>
+            <a:prstDash val="solid"/>
+          </a:ln>
+          <a:effectLst>
+            <a:glow rad="101600">
+              <a:schemeClr val="accent3">
+                <a:satMod val="175000"/>
+                <a:alpha val="40000"/>
+              </a:schemeClr>
+            </a:glow>
+          </a:effectLst>
+          <a:scene3d>
+            <a:camera prst="orthographicFront"/>
+            <a:lightRig rig="threePt" dir="t"/>
+          </a:scene3d>
+          <a:sp3d>
+            <a:bevelT w="114300" prst="artDeco"/>
+          </a:sp3d>
+        </p:spPr>
+        <p:style>
+          <a:lnRef idx="2">
+            <a:schemeClr val="accent1">
+              <a:shade val="50000"/>
+            </a:schemeClr>
+          </a:lnRef>
+          <a:fillRef idx="1">
+            <a:schemeClr val="accent1"/>
+          </a:fillRef>
+          <a:effectRef idx="0">
+            <a:schemeClr val="accent1"/>
+          </a:effectRef>
+          <a:fontRef idx="minor">
+            <a:schemeClr val="lt1"/>
+          </a:fontRef>
+        </p:style>
+        <p:txBody>
+          <a:bodyPr rtlCol="0" anchor="ctr"/>
+          <a:lstStyle/>
+          <a:p>
+            <a:pPr algn="ctr"/>
+            <a:r>
+              <a:rPr lang="ko-KR" altLang="en-US" sz="1200" b="1" spc="50" dirty="0" smtClean="0">
+                <a:ln w="13500">
+                  <a:solidFill>
+                    <a:schemeClr val="accent1">
+                      <a:shade val="2500"/>
+                      <a:alpha val="6500"/>
+                    </a:schemeClr>
+                  </a:solidFill>
+                  <a:prstDash val="solid"/>
+                </a:ln>
+                <a:solidFill>
+                  <a:schemeClr val="accent1">
+                    <a:lumMod val="50000"/>
+                  </a:schemeClr>
+                </a:solidFill>
+                <a:effectLst>
+                  <a:innerShdw blurRad="50900" dist="38500" dir="13500000">
+                    <a:srgbClr val="000000">
+                      <a:alpha val="60000"/>
+                    </a:srgbClr>
+                  </a:innerShdw>
+                </a:effectLst>
+              </a:rPr>
+              <a:t>메시지 박스</a:t>
+            </a:r>
+            <a:endParaRPr lang="ko-KR" altLang="en-US" sz="1200" b="1" spc="50" dirty="0" smtClean="0">
+              <a:ln w="13500">
+                <a:solidFill>
+                  <a:schemeClr val="accent1">
+                    <a:shade val="2500"/>
+                    <a:alpha val="6500"/>
+                  </a:schemeClr>
+                </a:solidFill>
+                <a:prstDash val="solid"/>
+              </a:ln>
+              <a:solidFill>
+                <a:schemeClr val="accent1">
+                  <a:lumMod val="50000"/>
+                </a:schemeClr>
+              </a:solidFill>
+              <a:effectLst>
+                <a:innerShdw blurRad="50900" dist="38500" dir="13500000">
+                  <a:srgbClr val="000000">
+                    <a:alpha val="60000"/>
+                  </a:srgbClr>
+                </a:innerShdw>
+              </a:effectLst>
+            </a:endParaRPr>
+          </a:p>
+        </p:txBody>
+      </p:sp>
+      <p:grpSp>
+        <p:nvGrpSpPr>
+          <p:cNvPr id="44" name="그룹 43"/>
+          <p:cNvGrpSpPr/>
+          <p:nvPr/>
+        </p:nvGrpSpPr>
+        <p:grpSpPr>
+          <a:xfrm>
+            <a:off x="1259632" y="692696"/>
+            <a:ext cx="504000" cy="504000"/>
+            <a:chOff x="-972616" y="692696"/>
+            <a:chExt cx="648000" cy="648000"/>
+          </a:xfrm>
+        </p:grpSpPr>
+        <p:sp>
+          <p:nvSpPr>
+            <p:cNvPr id="42" name="직사각형 41"/>
+            <p:cNvSpPr/>
+            <p:nvPr/>
+          </p:nvSpPr>
+          <p:spPr>
+            <a:xfrm>
+              <a:off x="-972616" y="692696"/>
+              <a:ext cx="648000" cy="648000"/>
+            </a:xfrm>
+            <a:prstGeom prst="rect">
+              <a:avLst/>
+            </a:prstGeom>
+            <a:solidFill>
+              <a:schemeClr val="accent4">
+                <a:lumMod val="60000"/>
+                <a:lumOff val="40000"/>
+              </a:schemeClr>
+            </a:solidFill>
+            <a:ln>
+              <a:solidFill>
+                <a:schemeClr val="accent1">
+                  <a:lumMod val="20000"/>
+                  <a:lumOff val="80000"/>
+                </a:schemeClr>
+              </a:solidFill>
+              <a:prstDash val="solid"/>
+            </a:ln>
+            <a:effectLst>
+              <a:outerShdw blurRad="63500" sx="102000" sy="102000" algn="ctr" rotWithShape="0">
+                <a:prstClr val="black">
+                  <a:alpha val="40000"/>
+                </a:prstClr>
+              </a:outerShdw>
+            </a:effectLst>
+            <a:scene3d>
+              <a:camera prst="orthographicFront"/>
+              <a:lightRig rig="threePt" dir="t"/>
+            </a:scene3d>
+            <a:sp3d>
+              <a:bevelT prst="slope"/>
+            </a:sp3d>
+          </p:spPr>
+          <p:style>
+            <a:lnRef idx="2">
+              <a:schemeClr val="accent1">
+                <a:shade val="50000"/>
+              </a:schemeClr>
+            </a:lnRef>
+            <a:fillRef idx="1">
+              <a:schemeClr val="accent1"/>
+            </a:fillRef>
+            <a:effectRef idx="0">
+              <a:schemeClr val="accent1"/>
+            </a:effectRef>
+            <a:fontRef idx="minor">
+              <a:schemeClr val="lt1"/>
+            </a:fontRef>
+          </p:style>
+          <p:txBody>
+            <a:bodyPr rtlCol="0" anchor="ctr">
+              <a:scene3d>
+                <a:camera prst="orthographicFront"/>
+                <a:lightRig rig="soft" dir="tl">
+                  <a:rot lat="0" lon="0" rev="0"/>
+                </a:lightRig>
+              </a:scene3d>
+              <a:sp3d contourW="25400" prstMaterial="matte">
+                <a:contourClr>
+                  <a:schemeClr val="accent2">
+                    <a:tint val="20000"/>
+                  </a:schemeClr>
+                </a:contourClr>
+              </a:sp3d>
+            </a:bodyPr>
+            <a:lstStyle/>
+            <a:p>
+              <a:pPr algn="ctr"/>
+              <a:endParaRPr lang="ko-KR" altLang="en-US" b="1" spc="50" dirty="0" smtClean="0">
+                <a:ln w="11430">
+                  <a:solidFill>
+                    <a:srgbClr val="00B050"/>
+                  </a:solidFill>
+                </a:ln>
+                <a:solidFill>
+                  <a:srgbClr val="00B050"/>
+                </a:solidFill>
+                <a:effectLst>
+                  <a:glow rad="228600">
+                    <a:schemeClr val="accent6">
+                      <a:satMod val="175000"/>
+                      <a:alpha val="40000"/>
+                    </a:schemeClr>
+                  </a:glow>
+                  <a:outerShdw blurRad="50800" dist="38100" dir="2700000" algn="tl" rotWithShape="0">
+                    <a:prstClr val="black">
+                      <a:alpha val="40000"/>
+                    </a:prstClr>
+                  </a:outerShdw>
+                </a:effectLst>
+              </a:endParaRPr>
+            </a:p>
+          </p:txBody>
+        </p:sp>
+        <p:pic>
+          <p:nvPicPr>
+            <p:cNvPr id="1029" name="Picture 5" descr="C:\Users\ediso\AppData\Local\Microsoft\Windows\INetCache\IE\8SOMCZ2D\save-icon-1257065_960_720[1].png"/>
+            <p:cNvPicPr preferRelativeResize="0">
+              <a:picLocks noChangeArrowheads="1"/>
+            </p:cNvPicPr>
+            <p:nvPr/>
+          </p:nvPicPr>
+          <p:blipFill>
+            <a:blip r:embed="rId4" cstate="print">
+              <a:clrChange>
+                <a:clrFrom>
+                  <a:srgbClr val="3771C8"/>
+                </a:clrFrom>
+                <a:clrTo>
+                  <a:srgbClr val="3771C8">
+                    <a:alpha val="0"/>
+                  </a:srgbClr>
+                </a:clrTo>
+              </a:clrChange>
+            </a:blip>
+            <a:srcRect/>
+            <a:stretch>
+              <a:fillRect/>
+            </a:stretch>
+          </p:blipFill>
+          <p:spPr bwMode="auto">
+            <a:xfrm>
+              <a:off x="-900608" y="764704"/>
+              <a:ext cx="504000" cy="504000"/>
+            </a:xfrm>
+            <a:prstGeom prst="rect">
+              <a:avLst/>
+            </a:prstGeom>
+            <a:noFill/>
+          </p:spPr>
+        </p:pic>
+      </p:grpSp>
+      <p:sp>
+        <p:nvSpPr>
+          <p:cNvPr id="50" name="모서리가 둥근 직사각형 49"/>
+          <p:cNvSpPr/>
+          <p:nvPr/>
+        </p:nvSpPr>
+        <p:spPr>
+          <a:xfrm>
+            <a:off x="611560" y="1916832"/>
+            <a:ext cx="1152128" cy="396000"/>
+          </a:xfrm>
+          <a:prstGeom prst="roundRect">
+            <a:avLst/>
+          </a:prstGeom>
+          <a:solidFill>
+            <a:schemeClr val="accent5">
+              <a:lumMod val="60000"/>
+              <a:lumOff val="40000"/>
+            </a:schemeClr>
+          </a:solidFill>
+          <a:ln>
+            <a:solidFill>
+              <a:schemeClr val="accent1">
+                <a:lumMod val="20000"/>
+                <a:lumOff val="80000"/>
+              </a:schemeClr>
+            </a:solidFill>
+            <a:prstDash val="solid"/>
+          </a:ln>
+          <a:effectLst>
+            <a:glow rad="101600">
+              <a:schemeClr val="accent3">
+                <a:satMod val="175000"/>
+                <a:alpha val="40000"/>
+              </a:schemeClr>
+            </a:glow>
+          </a:effectLst>
+          <a:scene3d>
+            <a:camera prst="orthographicFront"/>
+            <a:lightRig rig="threePt" dir="t"/>
+          </a:scene3d>
+          <a:sp3d>
+            <a:bevelT w="114300" prst="artDeco"/>
+          </a:sp3d>
+        </p:spPr>
+        <p:style>
+          <a:lnRef idx="2">
+            <a:schemeClr val="accent1">
+              <a:shade val="50000"/>
+            </a:schemeClr>
+          </a:lnRef>
+          <a:fillRef idx="1">
+            <a:schemeClr val="accent1"/>
+          </a:fillRef>
+          <a:effectRef idx="0">
+            <a:schemeClr val="accent1"/>
+          </a:effectRef>
+          <a:fontRef idx="minor">
+            <a:schemeClr val="lt1"/>
+          </a:fontRef>
+        </p:style>
+        <p:txBody>
+          <a:bodyPr rtlCol="0" anchor="ctr"/>
+          <a:lstStyle/>
+          <a:p>
+            <a:pPr algn="ctr"/>
+            <a:r>
+              <a:rPr lang="ko-KR" altLang="en-US" sz="1200" b="1" spc="50" dirty="0" smtClean="0">
+                <a:ln w="13500">
+                  <a:solidFill>
+                    <a:schemeClr val="accent1">
+                      <a:shade val="2500"/>
+                      <a:alpha val="6500"/>
+                    </a:schemeClr>
+                  </a:solidFill>
+                  <a:prstDash val="solid"/>
+                </a:ln>
+                <a:solidFill>
+                  <a:schemeClr val="accent1">
+                    <a:lumMod val="50000"/>
+                  </a:schemeClr>
+                </a:solidFill>
+                <a:effectLst>
+                  <a:innerShdw blurRad="50900" dist="38500" dir="13500000">
+                    <a:srgbClr val="000000">
+                      <a:alpha val="60000"/>
+                    </a:srgbClr>
+                  </a:innerShdw>
+                </a:effectLst>
+              </a:rPr>
+              <a:t>현재상황</a:t>
+            </a:r>
+            <a:endParaRPr lang="ko-KR" altLang="en-US" sz="1200" b="1" spc="50" dirty="0" smtClean="0">
+              <a:ln w="13500">
+                <a:solidFill>
+                  <a:schemeClr val="accent1">
+                    <a:shade val="2500"/>
+                    <a:alpha val="6500"/>
+                  </a:schemeClr>
+                </a:solidFill>
+                <a:prstDash val="solid"/>
+              </a:ln>
+              <a:solidFill>
+                <a:schemeClr val="accent1">
+                  <a:lumMod val="50000"/>
+                </a:schemeClr>
+              </a:solidFill>
+              <a:effectLst>
+                <a:innerShdw blurRad="50900" dist="38500" dir="13500000">
+                  <a:srgbClr val="000000">
+                    <a:alpha val="60000"/>
+                  </a:srgbClr>
+                </a:innerShdw>
+              </a:effectLst>
+            </a:endParaRPr>
+          </a:p>
+        </p:txBody>
+      </p:sp>
+      <p:sp>
+        <p:nvSpPr>
+          <p:cNvPr id="51" name="모서리가 둥근 직사각형 50"/>
+          <p:cNvSpPr/>
+          <p:nvPr/>
+        </p:nvSpPr>
+        <p:spPr>
+          <a:xfrm>
+            <a:off x="611560" y="2420888"/>
+            <a:ext cx="1152128" cy="396000"/>
+          </a:xfrm>
+          <a:prstGeom prst="roundRect">
+            <a:avLst/>
+          </a:prstGeom>
+          <a:solidFill>
+            <a:schemeClr val="accent5">
+              <a:lumMod val="60000"/>
+              <a:lumOff val="40000"/>
+            </a:schemeClr>
+          </a:solidFill>
+          <a:ln>
+            <a:solidFill>
+              <a:schemeClr val="accent1">
+                <a:lumMod val="20000"/>
+                <a:lumOff val="80000"/>
+              </a:schemeClr>
+            </a:solidFill>
+            <a:prstDash val="solid"/>
+          </a:ln>
+          <a:effectLst>
+            <a:glow rad="101600">
+              <a:schemeClr val="accent3">
+                <a:satMod val="175000"/>
+                <a:alpha val="40000"/>
+              </a:schemeClr>
+            </a:glow>
+          </a:effectLst>
+          <a:scene3d>
+            <a:camera prst="orthographicFront"/>
+            <a:lightRig rig="threePt" dir="t"/>
+          </a:scene3d>
+          <a:sp3d>
+            <a:bevelT w="114300" prst="artDeco"/>
+          </a:sp3d>
+        </p:spPr>
+        <p:style>
+          <a:lnRef idx="2">
+            <a:schemeClr val="accent1">
+              <a:shade val="50000"/>
+            </a:schemeClr>
+          </a:lnRef>
+          <a:fillRef idx="1">
+            <a:schemeClr val="accent1"/>
+          </a:fillRef>
+          <a:effectRef idx="0">
+            <a:schemeClr val="accent1"/>
+          </a:effectRef>
+          <a:fontRef idx="minor">
+            <a:schemeClr val="lt1"/>
+          </a:fontRef>
+        </p:style>
+        <p:txBody>
+          <a:bodyPr rtlCol="0" anchor="ctr"/>
+          <a:lstStyle/>
+          <a:p>
+            <a:pPr algn="ctr"/>
+            <a:r>
+              <a:rPr lang="ko-KR" altLang="en-US" sz="1200" b="1" spc="50" dirty="0" smtClean="0">
+                <a:ln w="13500">
+                  <a:solidFill>
+                    <a:schemeClr val="accent1">
+                      <a:shade val="2500"/>
+                      <a:alpha val="6500"/>
+                    </a:schemeClr>
+                  </a:solidFill>
+                  <a:prstDash val="solid"/>
+                </a:ln>
+                <a:solidFill>
+                  <a:schemeClr val="accent1">
+                    <a:lumMod val="50000"/>
+                  </a:schemeClr>
+                </a:solidFill>
+                <a:effectLst>
+                  <a:innerShdw blurRad="50900" dist="38500" dir="13500000">
+                    <a:srgbClr val="000000">
+                      <a:alpha val="60000"/>
+                    </a:srgbClr>
+                  </a:innerShdw>
+                </a:effectLst>
+              </a:rPr>
+              <a:t>인수 </a:t>
+            </a:r>
+            <a:r>
+              <a:rPr lang="en-US" altLang="ko-KR" sz="1200" b="1" spc="50" dirty="0" smtClean="0">
+                <a:ln w="13500">
+                  <a:solidFill>
+                    <a:schemeClr val="accent1">
+                      <a:shade val="2500"/>
+                      <a:alpha val="6500"/>
+                    </a:schemeClr>
+                  </a:solidFill>
+                  <a:prstDash val="solid"/>
+                </a:ln>
+                <a:solidFill>
+                  <a:schemeClr val="accent1">
+                    <a:lumMod val="50000"/>
+                  </a:schemeClr>
+                </a:solidFill>
+                <a:effectLst>
+                  <a:innerShdw blurRad="50900" dist="38500" dir="13500000">
+                    <a:srgbClr val="000000">
+                      <a:alpha val="60000"/>
+                    </a:srgbClr>
+                  </a:innerShdw>
+                </a:effectLst>
+              </a:rPr>
+              <a:t>/ </a:t>
+            </a:r>
+            <a:r>
+              <a:rPr lang="ko-KR" altLang="en-US" sz="1200" b="1" spc="50" dirty="0" smtClean="0">
+                <a:ln w="13500">
+                  <a:solidFill>
+                    <a:schemeClr val="accent1">
+                      <a:shade val="2500"/>
+                      <a:alpha val="6500"/>
+                    </a:schemeClr>
+                  </a:solidFill>
+                  <a:prstDash val="solid"/>
+                </a:ln>
+                <a:solidFill>
+                  <a:schemeClr val="accent1">
+                    <a:lumMod val="50000"/>
+                  </a:schemeClr>
+                </a:solidFill>
+                <a:effectLst>
+                  <a:innerShdw blurRad="50900" dist="38500" dir="13500000">
+                    <a:srgbClr val="000000">
+                      <a:alpha val="60000"/>
+                    </a:srgbClr>
+                  </a:innerShdw>
+                </a:effectLst>
+              </a:rPr>
+              <a:t>매각</a:t>
+            </a:r>
+            <a:endParaRPr lang="ko-KR" altLang="en-US" sz="1200" b="1" spc="50" dirty="0" smtClean="0">
+              <a:ln w="13500">
+                <a:solidFill>
+                  <a:schemeClr val="accent1">
+                    <a:shade val="2500"/>
+                    <a:alpha val="6500"/>
+                  </a:schemeClr>
+                </a:solidFill>
+                <a:prstDash val="solid"/>
+              </a:ln>
+              <a:solidFill>
+                <a:schemeClr val="accent1">
+                  <a:lumMod val="50000"/>
+                </a:schemeClr>
+              </a:solidFill>
+              <a:effectLst>
+                <a:innerShdw blurRad="50900" dist="38500" dir="13500000">
+                  <a:srgbClr val="000000">
+                    <a:alpha val="60000"/>
+                  </a:srgbClr>
+                </a:innerShdw>
+              </a:effectLst>
+            </a:endParaRPr>
+          </a:p>
+        </p:txBody>
+      </p:sp>
+      <p:sp>
+        <p:nvSpPr>
+          <p:cNvPr id="52" name="모서리가 둥근 직사각형 51"/>
+          <p:cNvSpPr/>
+          <p:nvPr/>
+        </p:nvSpPr>
+        <p:spPr>
+          <a:xfrm>
+            <a:off x="611560" y="2924944"/>
+            <a:ext cx="1152128" cy="396000"/>
+          </a:xfrm>
+          <a:prstGeom prst="roundRect">
+            <a:avLst/>
+          </a:prstGeom>
+          <a:solidFill>
+            <a:schemeClr val="accent5">
+              <a:lumMod val="60000"/>
+              <a:lumOff val="40000"/>
+            </a:schemeClr>
+          </a:solidFill>
+          <a:ln>
+            <a:solidFill>
+              <a:schemeClr val="accent1">
+                <a:lumMod val="20000"/>
+                <a:lumOff val="80000"/>
+              </a:schemeClr>
+            </a:solidFill>
+            <a:prstDash val="solid"/>
+          </a:ln>
+          <a:effectLst>
+            <a:glow rad="101600">
+              <a:schemeClr val="accent3">
+                <a:satMod val="175000"/>
+                <a:alpha val="40000"/>
+              </a:schemeClr>
+            </a:glow>
+          </a:effectLst>
+          <a:scene3d>
+            <a:camera prst="orthographicFront"/>
+            <a:lightRig rig="threePt" dir="t"/>
+          </a:scene3d>
+          <a:sp3d>
+            <a:bevelT w="114300" prst="artDeco"/>
+          </a:sp3d>
+        </p:spPr>
+        <p:style>
+          <a:lnRef idx="2">
+            <a:schemeClr val="accent1">
+              <a:shade val="50000"/>
+            </a:schemeClr>
+          </a:lnRef>
+          <a:fillRef idx="1">
+            <a:schemeClr val="accent1"/>
+          </a:fillRef>
+          <a:effectRef idx="0">
+            <a:schemeClr val="accent1"/>
+          </a:effectRef>
+          <a:fontRef idx="minor">
+            <a:schemeClr val="lt1"/>
+          </a:fontRef>
+        </p:style>
+        <p:txBody>
+          <a:bodyPr rtlCol="0" anchor="ctr"/>
+          <a:lstStyle/>
+          <a:p>
+            <a:pPr algn="ctr"/>
+            <a:r>
+              <a:rPr lang="ko-KR" altLang="en-US" sz="1200" b="1" spc="50" dirty="0" smtClean="0">
+                <a:ln w="13500">
+                  <a:solidFill>
+                    <a:schemeClr val="accent1">
+                      <a:shade val="2500"/>
+                      <a:alpha val="6500"/>
+                    </a:schemeClr>
+                  </a:solidFill>
+                  <a:prstDash val="solid"/>
+                </a:ln>
+                <a:solidFill>
+                  <a:schemeClr val="accent1">
+                    <a:lumMod val="50000"/>
+                  </a:schemeClr>
+                </a:solidFill>
+                <a:effectLst>
+                  <a:innerShdw blurRad="50900" dist="38500" dir="13500000">
+                    <a:srgbClr val="000000">
+                      <a:alpha val="60000"/>
+                    </a:srgbClr>
+                  </a:innerShdw>
+                </a:effectLst>
+              </a:rPr>
+              <a:t>재정 관리</a:t>
+            </a:r>
+            <a:endParaRPr lang="ko-KR" altLang="en-US" sz="1200" b="1" spc="50" dirty="0" smtClean="0">
+              <a:ln w="13500">
+                <a:solidFill>
+                  <a:schemeClr val="accent1">
+                    <a:shade val="2500"/>
+                    <a:alpha val="6500"/>
+                  </a:schemeClr>
+                </a:solidFill>
+                <a:prstDash val="solid"/>
+              </a:ln>
+              <a:solidFill>
+                <a:schemeClr val="accent1">
+                  <a:lumMod val="50000"/>
+                </a:schemeClr>
+              </a:solidFill>
+              <a:effectLst>
+                <a:innerShdw blurRad="50900" dist="38500" dir="13500000">
+                  <a:srgbClr val="000000">
+                    <a:alpha val="60000"/>
+                  </a:srgbClr>
+                </a:innerShdw>
+              </a:effectLst>
+            </a:endParaRPr>
+          </a:p>
+        </p:txBody>
+      </p:sp>
+      <p:sp>
+        <p:nvSpPr>
+          <p:cNvPr id="53" name="모서리가 둥근 직사각형 52"/>
+          <p:cNvSpPr/>
+          <p:nvPr/>
+        </p:nvSpPr>
+        <p:spPr>
+          <a:xfrm>
+            <a:off x="611560" y="3429000"/>
+            <a:ext cx="1152128" cy="396000"/>
+          </a:xfrm>
+          <a:prstGeom prst="roundRect">
+            <a:avLst/>
+          </a:prstGeom>
+          <a:solidFill>
+            <a:schemeClr val="accent5">
+              <a:lumMod val="60000"/>
+              <a:lumOff val="40000"/>
+            </a:schemeClr>
+          </a:solidFill>
+          <a:ln>
+            <a:solidFill>
+              <a:schemeClr val="accent1">
+                <a:lumMod val="20000"/>
+                <a:lumOff val="80000"/>
+              </a:schemeClr>
+            </a:solidFill>
+            <a:prstDash val="solid"/>
+          </a:ln>
+          <a:effectLst>
+            <a:glow rad="101600">
+              <a:schemeClr val="accent3">
+                <a:satMod val="175000"/>
+                <a:alpha val="40000"/>
+              </a:schemeClr>
+            </a:glow>
+          </a:effectLst>
+          <a:scene3d>
+            <a:camera prst="orthographicFront"/>
+            <a:lightRig rig="threePt" dir="t"/>
+          </a:scene3d>
+          <a:sp3d>
+            <a:bevelT w="114300" prst="artDeco"/>
+          </a:sp3d>
+        </p:spPr>
+        <p:style>
+          <a:lnRef idx="2">
+            <a:schemeClr val="accent1">
+              <a:shade val="50000"/>
+            </a:schemeClr>
+          </a:lnRef>
+          <a:fillRef idx="1">
+            <a:schemeClr val="accent1"/>
+          </a:fillRef>
+          <a:effectRef idx="0">
+            <a:schemeClr val="accent1"/>
+          </a:effectRef>
+          <a:fontRef idx="minor">
+            <a:schemeClr val="lt1"/>
+          </a:fontRef>
+        </p:style>
+        <p:txBody>
+          <a:bodyPr rtlCol="0" anchor="ctr"/>
+          <a:lstStyle/>
+          <a:p>
+            <a:pPr algn="ctr"/>
+            <a:r>
+              <a:rPr lang="ko-KR" altLang="en-US" sz="1200" b="1" spc="50" dirty="0" smtClean="0">
+                <a:ln w="13500">
+                  <a:solidFill>
+                    <a:schemeClr val="accent1">
+                      <a:shade val="2500"/>
+                      <a:alpha val="6500"/>
+                    </a:schemeClr>
+                  </a:solidFill>
+                  <a:prstDash val="solid"/>
+                </a:ln>
+                <a:solidFill>
+                  <a:schemeClr val="accent1">
+                    <a:lumMod val="50000"/>
+                  </a:schemeClr>
+                </a:solidFill>
+                <a:effectLst>
+                  <a:innerShdw blurRad="50900" dist="38500" dir="13500000">
+                    <a:srgbClr val="000000">
+                      <a:alpha val="60000"/>
+                    </a:srgbClr>
+                  </a:innerShdw>
+                </a:effectLst>
+              </a:rPr>
+              <a:t>팀 선수단 </a:t>
+            </a:r>
+            <a:endParaRPr lang="ko-KR" altLang="en-US" sz="1200" b="1" spc="50" dirty="0" smtClean="0">
+              <a:ln w="13500">
+                <a:solidFill>
+                  <a:schemeClr val="accent1">
+                    <a:shade val="2500"/>
+                    <a:alpha val="6500"/>
+                  </a:schemeClr>
+                </a:solidFill>
+                <a:prstDash val="solid"/>
+              </a:ln>
+              <a:solidFill>
+                <a:schemeClr val="accent1">
+                  <a:lumMod val="50000"/>
+                </a:schemeClr>
+              </a:solidFill>
+              <a:effectLst>
+                <a:innerShdw blurRad="50900" dist="38500" dir="13500000">
+                  <a:srgbClr val="000000">
+                    <a:alpha val="60000"/>
+                  </a:srgbClr>
+                </a:innerShdw>
+              </a:effectLst>
+            </a:endParaRPr>
+          </a:p>
+        </p:txBody>
+      </p:sp>
+      <p:sp>
+        <p:nvSpPr>
+          <p:cNvPr id="54" name="모서리가 둥근 직사각형 53"/>
+          <p:cNvSpPr/>
+          <p:nvPr/>
+        </p:nvSpPr>
+        <p:spPr>
+          <a:xfrm>
+            <a:off x="611560" y="3933056"/>
+            <a:ext cx="1152128" cy="396000"/>
+          </a:xfrm>
+          <a:prstGeom prst="roundRect">
+            <a:avLst/>
+          </a:prstGeom>
+          <a:solidFill>
+            <a:schemeClr val="accent5">
+              <a:lumMod val="60000"/>
+              <a:lumOff val="40000"/>
+            </a:schemeClr>
+          </a:solidFill>
+          <a:ln>
+            <a:solidFill>
+              <a:schemeClr val="accent1">
+                <a:lumMod val="20000"/>
+                <a:lumOff val="80000"/>
+              </a:schemeClr>
+            </a:solidFill>
+            <a:prstDash val="solid"/>
+          </a:ln>
+          <a:effectLst>
+            <a:glow rad="101600">
+              <a:schemeClr val="accent3">
+                <a:satMod val="175000"/>
+                <a:alpha val="40000"/>
+              </a:schemeClr>
+            </a:glow>
+          </a:effectLst>
+          <a:scene3d>
+            <a:camera prst="orthographicFront"/>
+            <a:lightRig rig="threePt" dir="t"/>
+          </a:scene3d>
+          <a:sp3d>
+            <a:bevelT w="114300" prst="artDeco"/>
+          </a:sp3d>
+        </p:spPr>
+        <p:style>
+          <a:lnRef idx="2">
+            <a:schemeClr val="accent1">
+              <a:shade val="50000"/>
+            </a:schemeClr>
+          </a:lnRef>
+          <a:fillRef idx="1">
+            <a:schemeClr val="accent1"/>
+          </a:fillRef>
+          <a:effectRef idx="0">
+            <a:schemeClr val="accent1"/>
+          </a:effectRef>
+          <a:fontRef idx="minor">
+            <a:schemeClr val="lt1"/>
+          </a:fontRef>
+        </p:style>
+        <p:txBody>
+          <a:bodyPr rtlCol="0" anchor="ctr"/>
+          <a:lstStyle/>
+          <a:p>
+            <a:pPr algn="ctr"/>
+            <a:r>
+              <a:rPr lang="ko-KR" altLang="en-US" sz="1200" b="1" spc="50" dirty="0" smtClean="0">
+                <a:ln w="13500">
+                  <a:solidFill>
+                    <a:schemeClr val="accent1">
+                      <a:shade val="2500"/>
+                      <a:alpha val="6500"/>
+                    </a:schemeClr>
+                  </a:solidFill>
+                  <a:prstDash val="solid"/>
+                </a:ln>
+                <a:solidFill>
+                  <a:schemeClr val="accent1">
+                    <a:lumMod val="50000"/>
+                  </a:schemeClr>
+                </a:solidFill>
+                <a:effectLst>
+                  <a:innerShdw blurRad="50900" dist="38500" dir="13500000">
+                    <a:srgbClr val="000000">
+                      <a:alpha val="60000"/>
+                    </a:srgbClr>
+                  </a:innerShdw>
+                </a:effectLst>
+              </a:rPr>
+              <a:t>팀 </a:t>
+            </a:r>
+            <a:r>
+              <a:rPr lang="ko-KR" altLang="en-US" sz="1200" b="1" spc="50" dirty="0" err="1" smtClean="0">
+                <a:ln w="13500">
+                  <a:solidFill>
+                    <a:schemeClr val="accent1">
+                      <a:shade val="2500"/>
+                      <a:alpha val="6500"/>
+                    </a:schemeClr>
+                  </a:solidFill>
+                  <a:prstDash val="solid"/>
+                </a:ln>
+                <a:solidFill>
+                  <a:schemeClr val="accent1">
+                    <a:lumMod val="50000"/>
+                  </a:schemeClr>
+                </a:solidFill>
+                <a:effectLst>
+                  <a:innerShdw blurRad="50900" dist="38500" dir="13500000">
+                    <a:srgbClr val="000000">
+                      <a:alpha val="60000"/>
+                    </a:srgbClr>
+                  </a:innerShdw>
+                </a:effectLst>
+              </a:rPr>
+              <a:t>코치단</a:t>
+            </a:r>
+            <a:endParaRPr lang="ko-KR" altLang="en-US" sz="1200" b="1" spc="50" dirty="0" smtClean="0">
+              <a:ln w="13500">
+                <a:solidFill>
+                  <a:schemeClr val="accent1">
+                    <a:shade val="2500"/>
+                    <a:alpha val="6500"/>
+                  </a:schemeClr>
+                </a:solidFill>
+                <a:prstDash val="solid"/>
+              </a:ln>
+              <a:solidFill>
+                <a:schemeClr val="accent1">
+                  <a:lumMod val="50000"/>
+                </a:schemeClr>
+              </a:solidFill>
+              <a:effectLst>
+                <a:innerShdw blurRad="50900" dist="38500" dir="13500000">
+                  <a:srgbClr val="000000">
+                    <a:alpha val="60000"/>
+                  </a:srgbClr>
+                </a:innerShdw>
+              </a:effectLst>
+            </a:endParaRPr>
+          </a:p>
+        </p:txBody>
+      </p:sp>
+      <p:sp>
+        <p:nvSpPr>
+          <p:cNvPr id="55" name="모서리가 둥근 직사각형 54"/>
+          <p:cNvSpPr/>
+          <p:nvPr/>
+        </p:nvSpPr>
+        <p:spPr>
+          <a:xfrm>
+            <a:off x="611560" y="4437112"/>
+            <a:ext cx="1152128" cy="396000"/>
+          </a:xfrm>
+          <a:prstGeom prst="roundRect">
+            <a:avLst/>
+          </a:prstGeom>
+          <a:solidFill>
+            <a:schemeClr val="accent5">
+              <a:lumMod val="60000"/>
+              <a:lumOff val="40000"/>
+            </a:schemeClr>
+          </a:solidFill>
+          <a:ln>
+            <a:solidFill>
+              <a:schemeClr val="accent1">
+                <a:lumMod val="20000"/>
+                <a:lumOff val="80000"/>
+              </a:schemeClr>
+            </a:solidFill>
+            <a:prstDash val="solid"/>
+          </a:ln>
+          <a:effectLst>
+            <a:glow rad="101600">
+              <a:schemeClr val="accent3">
+                <a:satMod val="175000"/>
+                <a:alpha val="40000"/>
+              </a:schemeClr>
+            </a:glow>
+          </a:effectLst>
+          <a:scene3d>
+            <a:camera prst="orthographicFront"/>
+            <a:lightRig rig="threePt" dir="t"/>
+          </a:scene3d>
+          <a:sp3d>
+            <a:bevelT w="114300" prst="artDeco"/>
+          </a:sp3d>
+        </p:spPr>
+        <p:style>
+          <a:lnRef idx="2">
+            <a:schemeClr val="accent1">
+              <a:shade val="50000"/>
+            </a:schemeClr>
+          </a:lnRef>
+          <a:fillRef idx="1">
+            <a:schemeClr val="accent1"/>
+          </a:fillRef>
+          <a:effectRef idx="0">
+            <a:schemeClr val="accent1"/>
+          </a:effectRef>
+          <a:fontRef idx="minor">
+            <a:schemeClr val="lt1"/>
+          </a:fontRef>
+        </p:style>
+        <p:txBody>
+          <a:bodyPr rtlCol="0" anchor="ctr"/>
+          <a:lstStyle/>
+          <a:p>
+            <a:pPr algn="ctr"/>
+            <a:r>
+              <a:rPr lang="ko-KR" altLang="en-US" sz="1200" b="1" spc="50" dirty="0" smtClean="0">
+                <a:ln w="13500">
+                  <a:solidFill>
+                    <a:schemeClr val="accent1">
+                      <a:shade val="2500"/>
+                      <a:alpha val="6500"/>
+                    </a:schemeClr>
+                  </a:solidFill>
+                  <a:prstDash val="solid"/>
+                </a:ln>
+                <a:solidFill>
+                  <a:schemeClr val="accent1">
+                    <a:lumMod val="50000"/>
+                  </a:schemeClr>
+                </a:solidFill>
+                <a:effectLst>
+                  <a:innerShdw blurRad="50900" dist="38500" dir="13500000">
+                    <a:srgbClr val="000000">
+                      <a:alpha val="60000"/>
+                    </a:srgbClr>
+                  </a:innerShdw>
+                </a:effectLst>
+              </a:rPr>
+              <a:t>팀 직원</a:t>
+            </a:r>
+            <a:endParaRPr lang="ko-KR" altLang="en-US" sz="1200" b="1" spc="50" dirty="0" smtClean="0">
+              <a:ln w="13500">
+                <a:solidFill>
+                  <a:schemeClr val="accent1">
+                    <a:shade val="2500"/>
+                    <a:alpha val="6500"/>
+                  </a:schemeClr>
+                </a:solidFill>
+                <a:prstDash val="solid"/>
+              </a:ln>
+              <a:solidFill>
+                <a:schemeClr val="accent1">
+                  <a:lumMod val="50000"/>
+                </a:schemeClr>
+              </a:solidFill>
+              <a:effectLst>
+                <a:innerShdw blurRad="50900" dist="38500" dir="13500000">
+                  <a:srgbClr val="000000">
+                    <a:alpha val="60000"/>
+                  </a:srgbClr>
+                </a:innerShdw>
+              </a:effectLst>
+            </a:endParaRPr>
+          </a:p>
+        </p:txBody>
+      </p:sp>
+      <p:sp>
+        <p:nvSpPr>
+          <p:cNvPr id="56" name="모서리가 둥근 직사각형 55"/>
+          <p:cNvSpPr/>
+          <p:nvPr/>
+        </p:nvSpPr>
+        <p:spPr>
+          <a:xfrm>
+            <a:off x="611560" y="4941168"/>
+            <a:ext cx="1152128" cy="396000"/>
+          </a:xfrm>
+          <a:prstGeom prst="roundRect">
+            <a:avLst/>
+          </a:prstGeom>
+          <a:solidFill>
+            <a:schemeClr val="accent5">
+              <a:lumMod val="60000"/>
+              <a:lumOff val="40000"/>
+            </a:schemeClr>
+          </a:solidFill>
+          <a:ln>
+            <a:solidFill>
+              <a:schemeClr val="accent1">
+                <a:lumMod val="20000"/>
+                <a:lumOff val="80000"/>
+              </a:schemeClr>
+            </a:solidFill>
+            <a:prstDash val="solid"/>
+          </a:ln>
+          <a:effectLst>
+            <a:glow rad="101600">
+              <a:schemeClr val="accent3">
+                <a:satMod val="175000"/>
+                <a:alpha val="40000"/>
+              </a:schemeClr>
+            </a:glow>
+          </a:effectLst>
+          <a:scene3d>
+            <a:camera prst="orthographicFront"/>
+            <a:lightRig rig="threePt" dir="t"/>
+          </a:scene3d>
+          <a:sp3d>
+            <a:bevelT w="114300" prst="artDeco"/>
+          </a:sp3d>
+        </p:spPr>
+        <p:style>
+          <a:lnRef idx="2">
+            <a:schemeClr val="accent1">
+              <a:shade val="50000"/>
+            </a:schemeClr>
+          </a:lnRef>
+          <a:fillRef idx="1">
+            <a:schemeClr val="accent1"/>
+          </a:fillRef>
+          <a:effectRef idx="0">
+            <a:schemeClr val="accent1"/>
+          </a:effectRef>
+          <a:fontRef idx="minor">
+            <a:schemeClr val="lt1"/>
+          </a:fontRef>
+        </p:style>
+        <p:txBody>
+          <a:bodyPr rtlCol="0" anchor="ctr"/>
+          <a:lstStyle/>
+          <a:p>
+            <a:pPr algn="ctr"/>
+            <a:r>
+              <a:rPr lang="ko-KR" altLang="en-US" sz="1200" b="1" spc="50" dirty="0" smtClean="0">
+                <a:ln w="13500">
+                  <a:solidFill>
+                    <a:schemeClr val="accent1">
+                      <a:shade val="2500"/>
+                      <a:alpha val="6500"/>
+                    </a:schemeClr>
+                  </a:solidFill>
+                  <a:prstDash val="solid"/>
+                </a:ln>
+                <a:solidFill>
+                  <a:schemeClr val="accent1">
+                    <a:lumMod val="50000"/>
+                  </a:schemeClr>
+                </a:solidFill>
+                <a:effectLst>
+                  <a:innerShdw blurRad="50900" dist="38500" dir="13500000">
+                    <a:srgbClr val="000000">
+                      <a:alpha val="60000"/>
+                    </a:srgbClr>
+                  </a:innerShdw>
+                </a:effectLst>
+              </a:rPr>
+              <a:t>스폰서</a:t>
+            </a:r>
+            <a:endParaRPr lang="ko-KR" altLang="en-US" sz="1200" b="1" spc="50" dirty="0" smtClean="0">
+              <a:ln w="13500">
+                <a:solidFill>
+                  <a:schemeClr val="accent1">
+                    <a:shade val="2500"/>
+                    <a:alpha val="6500"/>
+                  </a:schemeClr>
+                </a:solidFill>
+                <a:prstDash val="solid"/>
+              </a:ln>
+              <a:solidFill>
+                <a:schemeClr val="accent1">
+                  <a:lumMod val="50000"/>
+                </a:schemeClr>
+              </a:solidFill>
+              <a:effectLst>
+                <a:innerShdw blurRad="50900" dist="38500" dir="13500000">
+                  <a:srgbClr val="000000">
+                    <a:alpha val="60000"/>
+                  </a:srgbClr>
+                </a:innerShdw>
+              </a:effectLst>
+            </a:endParaRPr>
+          </a:p>
+        </p:txBody>
+      </p:sp>
+      <p:sp>
+        <p:nvSpPr>
+          <p:cNvPr id="57" name="모서리가 둥근 직사각형 56"/>
+          <p:cNvSpPr/>
+          <p:nvPr/>
+        </p:nvSpPr>
+        <p:spPr>
+          <a:xfrm>
+            <a:off x="611560" y="5445224"/>
+            <a:ext cx="1152128" cy="396000"/>
+          </a:xfrm>
+          <a:prstGeom prst="roundRect">
+            <a:avLst/>
+          </a:prstGeom>
+          <a:solidFill>
+            <a:schemeClr val="accent5">
+              <a:lumMod val="60000"/>
+              <a:lumOff val="40000"/>
+            </a:schemeClr>
+          </a:solidFill>
+          <a:ln>
+            <a:solidFill>
+              <a:schemeClr val="accent1">
+                <a:lumMod val="20000"/>
+                <a:lumOff val="80000"/>
+              </a:schemeClr>
+            </a:solidFill>
+            <a:prstDash val="solid"/>
+          </a:ln>
+          <a:effectLst>
+            <a:glow rad="101600">
+              <a:schemeClr val="accent3">
+                <a:satMod val="175000"/>
+                <a:alpha val="40000"/>
+              </a:schemeClr>
+            </a:glow>
+          </a:effectLst>
+          <a:scene3d>
+            <a:camera prst="orthographicFront"/>
+            <a:lightRig rig="threePt" dir="t"/>
+          </a:scene3d>
+          <a:sp3d>
+            <a:bevelT w="114300" prst="artDeco"/>
+          </a:sp3d>
+        </p:spPr>
+        <p:style>
+          <a:lnRef idx="2">
+            <a:schemeClr val="accent1">
+              <a:shade val="50000"/>
+            </a:schemeClr>
+          </a:lnRef>
+          <a:fillRef idx="1">
+            <a:schemeClr val="accent1"/>
+          </a:fillRef>
+          <a:effectRef idx="0">
+            <a:schemeClr val="accent1"/>
+          </a:effectRef>
+          <a:fontRef idx="minor">
+            <a:schemeClr val="lt1"/>
+          </a:fontRef>
+        </p:style>
+        <p:txBody>
+          <a:bodyPr rtlCol="0" anchor="ctr"/>
+          <a:lstStyle/>
+          <a:p>
+            <a:pPr algn="ctr"/>
+            <a:r>
+              <a:rPr lang="ko-KR" altLang="en-US" sz="1200" b="1" spc="50" dirty="0" smtClean="0">
+                <a:ln w="13500">
+                  <a:solidFill>
+                    <a:schemeClr val="accent1">
+                      <a:shade val="2500"/>
+                      <a:alpha val="6500"/>
+                    </a:schemeClr>
+                  </a:solidFill>
+                  <a:prstDash val="solid"/>
+                </a:ln>
+                <a:solidFill>
+                  <a:schemeClr val="accent1">
+                    <a:lumMod val="50000"/>
+                  </a:schemeClr>
+                </a:solidFill>
+                <a:effectLst>
+                  <a:innerShdw blurRad="50900" dist="38500" dir="13500000">
+                    <a:srgbClr val="000000">
+                      <a:alpha val="60000"/>
+                    </a:srgbClr>
+                  </a:innerShdw>
+                </a:effectLst>
+              </a:rPr>
+              <a:t>행동하기</a:t>
+            </a:r>
+            <a:endParaRPr lang="ko-KR" altLang="en-US" sz="1200" b="1" spc="50" dirty="0" smtClean="0">
+              <a:ln w="13500">
+                <a:solidFill>
+                  <a:schemeClr val="accent1">
+                    <a:shade val="2500"/>
+                    <a:alpha val="6500"/>
+                  </a:schemeClr>
+                </a:solidFill>
+                <a:prstDash val="solid"/>
+              </a:ln>
+              <a:solidFill>
+                <a:schemeClr val="accent1">
+                  <a:lumMod val="50000"/>
+                </a:schemeClr>
+              </a:solidFill>
+              <a:effectLst>
+                <a:innerShdw blurRad="50900" dist="38500" dir="13500000">
+                  <a:srgbClr val="000000">
+                    <a:alpha val="60000"/>
+                  </a:srgbClr>
+                </a:innerShdw>
+              </a:effectLst>
+            </a:endParaRPr>
+          </a:p>
+        </p:txBody>
+      </p:sp>
+      <p:sp>
+        <p:nvSpPr>
+          <p:cNvPr id="59" name="모서리가 둥근 직사각형 58"/>
+          <p:cNvSpPr/>
+          <p:nvPr/>
+        </p:nvSpPr>
+        <p:spPr>
+          <a:xfrm>
+            <a:off x="1907704" y="692696"/>
+            <a:ext cx="6804016" cy="504000"/>
+          </a:xfrm>
+          <a:prstGeom prst="roundRect">
+            <a:avLst/>
+          </a:prstGeom>
+          <a:solidFill>
+            <a:srgbClr val="0070C0">
+              <a:alpha val="70000"/>
+            </a:srgbClr>
+          </a:solidFill>
+          <a:ln>
+            <a:solidFill>
+              <a:schemeClr val="tx1"/>
+            </a:solidFill>
+            <a:prstDash val="solid"/>
+          </a:ln>
+          <a:effectLst/>
+          <a:scene3d>
+            <a:camera prst="orthographicFront"/>
+            <a:lightRig rig="threePt" dir="t"/>
+          </a:scene3d>
+          <a:sp3d/>
+        </p:spPr>
+        <p:style>
+          <a:lnRef idx="2">
+            <a:schemeClr val="accent1">
+              <a:shade val="50000"/>
+            </a:schemeClr>
+          </a:lnRef>
+          <a:fillRef idx="1">
+            <a:schemeClr val="accent1"/>
+          </a:fillRef>
+          <a:effectRef idx="0">
+            <a:schemeClr val="accent1"/>
+          </a:effectRef>
+          <a:fontRef idx="minor">
+            <a:schemeClr val="lt1"/>
+          </a:fontRef>
+        </p:style>
+        <p:txBody>
+          <a:bodyPr rtlCol="0" anchor="ctr">
+            <a:scene3d>
+              <a:camera prst="orthographicFront"/>
+              <a:lightRig rig="soft" dir="tl">
+                <a:rot lat="0" lon="0" rev="0"/>
+              </a:lightRig>
+            </a:scene3d>
+            <a:sp3d contourW="25400" prstMaterial="matte">
+              <a:bevelT w="25400" h="55880" prst="artDeco"/>
+              <a:contourClr>
+                <a:schemeClr val="accent2">
+                  <a:tint val="20000"/>
+                </a:schemeClr>
+              </a:contourClr>
+            </a:sp3d>
+          </a:bodyPr>
+          <a:lstStyle/>
+          <a:p>
+            <a:pPr algn="ctr"/>
+            <a:endParaRPr lang="ko-KR" altLang="en-US" b="1" spc="50" dirty="0" smtClean="0">
+              <a:ln w="11430">
+                <a:solidFill>
+                  <a:srgbClr val="00B050"/>
+                </a:solidFill>
+              </a:ln>
+              <a:solidFill>
+                <a:srgbClr val="00B050"/>
+              </a:solidFill>
+              <a:effectLst>
+                <a:glow rad="228600">
+                  <a:schemeClr val="accent6">
+                    <a:satMod val="175000"/>
+                    <a:alpha val="40000"/>
+                  </a:schemeClr>
+                </a:glow>
+                <a:outerShdw blurRad="50800" dist="38100" dir="2700000" algn="tl" rotWithShape="0">
+                  <a:prstClr val="black">
+                    <a:alpha val="40000"/>
+                  </a:prstClr>
+                </a:outerShdw>
+              </a:effectLst>
+            </a:endParaRPr>
+          </a:p>
+        </p:txBody>
+      </p:sp>
     </p:spTree>
   </p:cSld>
   <p:clrMapOvr>
@@ -6592,22 +8312,19 @@
       <a:spPr>
         <a:solidFill>
           <a:srgbClr val="92D050">
-            <a:alpha val="40000"/>
+            <a:alpha val="70000"/>
           </a:srgbClr>
         </a:solidFill>
         <a:ln>
           <a:solidFill>
-            <a:srgbClr val="92D050"/>
+            <a:schemeClr val="accent3">
+              <a:lumMod val="60000"/>
+              <a:lumOff val="40000"/>
+            </a:schemeClr>
           </a:solidFill>
           <a:prstDash val="solid"/>
         </a:ln>
-        <a:effectLst>
-          <a:outerShdw blurRad="63500" sx="102000" sy="102000" algn="ctr" rotWithShape="0">
-            <a:prstClr val="black">
-              <a:alpha val="40000"/>
-            </a:prstClr>
-          </a:outerShdw>
-        </a:effectLst>
+        <a:effectLst/>
         <a:scene3d>
           <a:camera prst="orthographicFront"/>
           <a:lightRig rig="threePt" dir="t"/>

</xml_diff>